<commit_message>
DSA - Algorithm Complexity HW -A
</commit_message>
<xml_diff>
--- a/Programming with C#/5. C# Data Structures and Algorithms/01. Data Structures Algorithms and Complexity - ✘/Data-Structures-Algorithms-and-Complexity.pptx
+++ b/Programming with C#/5. C# Data Structures and Algorithms/01. Data Structures Algorithms and Complexity - ✘/Data-Structures-Algorithms-and-Complexity.pptx
@@ -333,7 +333,7 @@
             <a:fld id="{3BF7C7B5-275F-4D1F-9AB4-9255447DBC73}" type="datetimeFigureOut">
               <a:rPr lang="en-US"/>
               <a:pPr/>
-              <a:t>28.05.2013</a:t>
+              <a:t>8/20/2014</a:t>
             </a:fld>
             <a:endParaRPr lang="en-US" dirty="0"/>
           </a:p>
@@ -564,7 +564,7 @@
             <a:fld id="{9B46F231-FB2B-4655-A644-E2477325E686}" type="datetimeFigureOut">
               <a:rPr lang="en-US"/>
               <a:pPr/>
-              <a:t>28.05.2013</a:t>
+              <a:t>8/20/2014</a:t>
             </a:fld>
             <a:endParaRPr lang="en-US" dirty="0"/>
           </a:p>
@@ -8159,154 +8159,6 @@
           </a:p>
         </p:txBody>
       </p:sp>
-      <p:sp>
-        <p:nvSpPr>
-          <p:cNvPr id="14" name="Text Placeholder 4"/>
-          <p:cNvSpPr>
-            <a:spLocks noGrp="1"/>
-          </p:cNvSpPr>
-          <p:nvPr>
-            <p:ph type="body" sz="quarter" idx="10"/>
-          </p:nvPr>
-        </p:nvSpPr>
-        <p:spPr>
-          <a:xfrm>
-            <a:off x="419099" y="4572000"/>
-            <a:ext cx="3853295" cy="533400"/>
-          </a:xfrm>
-        </p:spPr>
-        <p:txBody>
-          <a:bodyPr/>
-          <a:lstStyle/>
-          <a:p>
-            <a:r>
-              <a:rPr lang="en-US" dirty="0" smtClean="0"/>
-              <a:t>Svetlin Nakov</a:t>
-            </a:r>
-            <a:endParaRPr lang="en-US" dirty="0"/>
-          </a:p>
-        </p:txBody>
-      </p:sp>
-      <p:sp>
-        <p:nvSpPr>
-          <p:cNvPr id="15" name="Text Placeholder 5"/>
-          <p:cNvSpPr>
-            <a:spLocks noGrp="1"/>
-          </p:cNvSpPr>
-          <p:nvPr>
-            <p:ph type="body" sz="quarter" idx="11"/>
-          </p:nvPr>
-        </p:nvSpPr>
-        <p:spPr>
-          <a:xfrm>
-            <a:off x="457200" y="5833646"/>
-            <a:ext cx="3810000" cy="369332"/>
-          </a:xfrm>
-        </p:spPr>
-        <p:txBody>
-          <a:bodyPr/>
-          <a:lstStyle/>
-          <a:p>
-            <a:r>
-              <a:rPr lang="en-US" dirty="0" smtClean="0"/>
-              <a:t>Telerik Software Academy</a:t>
-            </a:r>
-            <a:endParaRPr lang="en-US" dirty="0"/>
-          </a:p>
-        </p:txBody>
-      </p:sp>
-      <p:sp>
-        <p:nvSpPr>
-          <p:cNvPr id="16" name="Text Placeholder 6"/>
-          <p:cNvSpPr>
-            <a:spLocks noGrp="1"/>
-          </p:cNvSpPr>
-          <p:nvPr>
-            <p:ph type="body" sz="quarter" idx="12"/>
-          </p:nvPr>
-        </p:nvSpPr>
-        <p:spPr>
-          <a:xfrm>
-            <a:off x="457200" y="6138446"/>
-            <a:ext cx="3810000" cy="338554"/>
-          </a:xfrm>
-        </p:spPr>
-        <p:txBody>
-          <a:bodyPr/>
-          <a:lstStyle/>
-          <a:p>
-            <a:r>
-              <a:rPr lang="en-US" dirty="0" smtClean="0">
-                <a:hlinkClick r:id="rId3"/>
-              </a:rPr>
-              <a:t>academy.telerik.com</a:t>
-            </a:r>
-            <a:r>
-              <a:rPr lang="en-US" dirty="0" smtClean="0"/>
-              <a:t>   </a:t>
-            </a:r>
-            <a:endParaRPr lang="en-US" dirty="0"/>
-          </a:p>
-        </p:txBody>
-      </p:sp>
-      <p:sp>
-        <p:nvSpPr>
-          <p:cNvPr id="4" name="Text Placeholder 3"/>
-          <p:cNvSpPr>
-            <a:spLocks noGrp="1"/>
-          </p:cNvSpPr>
-          <p:nvPr>
-            <p:ph type="body" sz="quarter" idx="13"/>
-          </p:nvPr>
-        </p:nvSpPr>
-        <p:spPr>
-          <a:xfrm>
-            <a:off x="431800" y="5029200"/>
-            <a:ext cx="3838864" cy="461665"/>
-          </a:xfrm>
-        </p:spPr>
-        <p:txBody>
-          <a:bodyPr/>
-          <a:lstStyle/>
-          <a:p>
-            <a:r>
-              <a:rPr lang="en-US" dirty="0" smtClean="0"/>
-              <a:t>Technical Trainer</a:t>
-            </a:r>
-            <a:endParaRPr lang="en-US" dirty="0"/>
-          </a:p>
-        </p:txBody>
-      </p:sp>
-      <p:sp>
-        <p:nvSpPr>
-          <p:cNvPr id="6" name="Text Placeholder 5"/>
-          <p:cNvSpPr>
-            <a:spLocks noGrp="1"/>
-          </p:cNvSpPr>
-          <p:nvPr>
-            <p:ph type="body" sz="quarter" idx="14"/>
-          </p:nvPr>
-        </p:nvSpPr>
-        <p:spPr>
-          <a:xfrm>
-            <a:off x="457200" y="5405735"/>
-            <a:ext cx="3810000" cy="369332"/>
-          </a:xfrm>
-        </p:spPr>
-        <p:txBody>
-          <a:bodyPr/>
-          <a:lstStyle/>
-          <a:p>
-            <a:r>
-              <a:rPr lang="en-US" sz="1800" dirty="0" smtClean="0">
-                <a:hlinkClick r:id="rId4"/>
-              </a:rPr>
-              <a:t>www.nakov.com</a:t>
-            </a:r>
-            <a:endParaRPr lang="en-US" sz="1800" dirty="0"/>
-          </a:p>
-        </p:txBody>
-      </p:sp>
       <p:pic>
         <p:nvPicPr>
           <p:cNvPr id="17" name="Picture 5"/>
@@ -8316,7 +8168,7 @@
           <p:nvPr/>
         </p:nvPicPr>
         <p:blipFill>
-          <a:blip r:embed="rId5">
+          <a:blip r:embed="rId3">
             <a:extLst>
               <a:ext uri="{28A0092B-C50C-407E-A947-70E740481C1C}">
                 <a14:useLocalDpi xmlns:a14="http://schemas.microsoft.com/office/drawing/2010/main"/>
@@ -8374,7 +8226,7 @@
       <p:pic>
         <p:nvPicPr>
           <p:cNvPr id="19" name="Picture 18">
-            <a:hlinkClick r:id="rId6"/>
+            <a:hlinkClick r:id="rId4"/>
           </p:cNvPr>
           <p:cNvPicPr>
             <a:picLocks noChangeAspect="1"/>
@@ -8382,7 +8234,7 @@
           <p:nvPr/>
         </p:nvPicPr>
         <p:blipFill>
-          <a:blip r:embed="rId7" cstate="screen">
+          <a:blip r:embed="rId5" cstate="screen">
             <a:extLst>
               <a:ext uri="{28A0092B-C50C-407E-A947-70E740481C1C}">
                 <a14:useLocalDpi xmlns:a14="http://schemas.microsoft.com/office/drawing/2010/main"/>
@@ -8395,7 +8247,7 @@
         </p:blipFill>
         <p:spPr>
           <a:xfrm>
-            <a:off x="3636037" y="4933106"/>
+            <a:off x="1066800" y="4072762"/>
             <a:ext cx="1227557" cy="1170374"/>
           </a:xfrm>
           <a:prstGeom prst="rect">
@@ -8412,7 +8264,7 @@
           <p:nvPr/>
         </p:nvPicPr>
         <p:blipFill>
-          <a:blip r:embed="rId8" cstate="screen">
+          <a:blip r:embed="rId6" cstate="screen">
             <a:extLst>
               <a:ext uri="{28A0092B-C50C-407E-A947-70E740481C1C}">
                 <a14:useLocalDpi xmlns:a14="http://schemas.microsoft.com/office/drawing/2010/main"/>
@@ -8442,7 +8294,7 @@
           <p:nvPr/>
         </p:nvPicPr>
         <p:blipFill>
-          <a:blip r:embed="rId9" cstate="screen">
+          <a:blip r:embed="rId7" cstate="screen">
             <a:extLst>
               <a:ext uri="{28A0092B-C50C-407E-A947-70E740481C1C}">
                 <a14:useLocalDpi xmlns:a14="http://schemas.microsoft.com/office/drawing/2010/main"/>
@@ -8476,6 +8328,817 @@
           </a:extLst>
         </p:spPr>
       </p:pic>
+      <p:sp>
+        <p:nvSpPr>
+          <p:cNvPr id="18" name="Text Placeholder 6"/>
+          <p:cNvSpPr>
+            <a:spLocks noGrp="1"/>
+          </p:cNvSpPr>
+          <p:nvPr/>
+        </p:nvSpPr>
+        <p:spPr>
+          <a:xfrm>
+            <a:off x="429086" y="5726668"/>
+            <a:ext cx="3990513" cy="400110"/>
+          </a:xfrm>
+          <a:prstGeom prst="rect">
+            <a:avLst/>
+          </a:prstGeom>
+          <a:noFill/>
+        </p:spPr>
+        <p:txBody>
+          <a:bodyPr wrap="square" rtlCol="0">
+            <a:spAutoFit/>
+          </a:bodyPr>
+          <a:lstStyle>
+            <a:lvl1pPr marL="319088" indent="-319088" algn="l" rtl="0" eaLnBrk="0" fontAlgn="base" hangingPunct="0">
+              <a:spcBef>
+                <a:spcPct val="20000"/>
+              </a:spcBef>
+              <a:spcAft>
+                <a:spcPct val="0"/>
+              </a:spcAft>
+              <a:buClr>
+                <a:schemeClr val="accent5">
+                  <a:lumMod val="40000"/>
+                  <a:lumOff val="60000"/>
+                </a:schemeClr>
+              </a:buClr>
+              <a:buSzPct val="70000"/>
+              <a:buFont typeface="Wingdings 2" pitchFamily="18" charset="2"/>
+              <a:buNone/>
+              <a:defRPr lang="en-US" sz="2000" b="1" kern="1200" dirty="0">
+                <a:solidFill>
+                  <a:schemeClr val="tx2">
+                    <a:lumMod val="20000"/>
+                    <a:lumOff val="80000"/>
+                  </a:schemeClr>
+                </a:solidFill>
+                <a:effectLst>
+                  <a:outerShdw blurRad="38100" dist="38100" dir="2700000" algn="tl">
+                    <a:srgbClr val="000000">
+                      <a:alpha val="43137"/>
+                    </a:srgbClr>
+                  </a:outerShdw>
+                </a:effectLst>
+                <a:latin typeface="Corbel" pitchFamily="34" charset="0"/>
+                <a:ea typeface="+mn-ea"/>
+                <a:cs typeface="+mn-cs"/>
+              </a:defRPr>
+            </a:lvl1pPr>
+            <a:lvl2pPr marL="630238" indent="-273050" algn="l" rtl="0" eaLnBrk="0" fontAlgn="base" hangingPunct="0">
+              <a:spcBef>
+                <a:spcPct val="20000"/>
+              </a:spcBef>
+              <a:spcAft>
+                <a:spcPct val="0"/>
+              </a:spcAft>
+              <a:buClr>
+                <a:schemeClr val="accent2">
+                  <a:lumMod val="60000"/>
+                  <a:lumOff val="40000"/>
+                </a:schemeClr>
+              </a:buClr>
+              <a:buFont typeface="Wingdings 2" pitchFamily="18" charset="2"/>
+              <a:buChar char=""/>
+              <a:defRPr sz="3000" b="1" kern="1200">
+                <a:solidFill>
+                  <a:schemeClr val="tx1">
+                    <a:lumMod val="20000"/>
+                    <a:lumOff val="80000"/>
+                  </a:schemeClr>
+                </a:solidFill>
+                <a:effectLst>
+                  <a:outerShdw blurRad="38100" dist="38100" dir="2700000" algn="tl">
+                    <a:srgbClr val="000000">
+                      <a:alpha val="43137"/>
+                    </a:srgbClr>
+                  </a:outerShdw>
+                </a:effectLst>
+                <a:latin typeface="+mn-lt"/>
+                <a:ea typeface="+mn-ea"/>
+                <a:cs typeface="+mn-cs"/>
+              </a:defRPr>
+            </a:lvl2pPr>
+            <a:lvl3pPr marL="922338" indent="-273050" algn="l" rtl="0" eaLnBrk="0" fontAlgn="base" hangingPunct="0">
+              <a:spcBef>
+                <a:spcPct val="20000"/>
+              </a:spcBef>
+              <a:spcAft>
+                <a:spcPct val="0"/>
+              </a:spcAft>
+              <a:buClr>
+                <a:schemeClr val="tx1">
+                  <a:lumMod val="50000"/>
+                </a:schemeClr>
+              </a:buClr>
+              <a:buFont typeface="Wingdings 2" pitchFamily="18" charset="2"/>
+              <a:buChar char=""/>
+              <a:defRPr sz="2800" b="1" kern="1200">
+                <a:solidFill>
+                  <a:schemeClr val="tx1">
+                    <a:lumMod val="20000"/>
+                    <a:lumOff val="80000"/>
+                  </a:schemeClr>
+                </a:solidFill>
+                <a:effectLst>
+                  <a:outerShdw blurRad="38100" dist="38100" dir="2700000" algn="tl">
+                    <a:srgbClr val="000000">
+                      <a:alpha val="43137"/>
+                    </a:srgbClr>
+                  </a:outerShdw>
+                </a:effectLst>
+                <a:latin typeface="+mn-lt"/>
+                <a:ea typeface="+mn-ea"/>
+                <a:cs typeface="+mn-cs"/>
+              </a:defRPr>
+            </a:lvl3pPr>
+            <a:lvl4pPr marL="1187450" indent="-228600" algn="l" rtl="0" eaLnBrk="0" fontAlgn="base" hangingPunct="0">
+              <a:spcBef>
+                <a:spcPct val="20000"/>
+              </a:spcBef>
+              <a:spcAft>
+                <a:spcPct val="0"/>
+              </a:spcAft>
+              <a:buClr>
+                <a:srgbClr val="F8BD52"/>
+              </a:buClr>
+              <a:buFont typeface="Wingdings 2" pitchFamily="18" charset="2"/>
+              <a:buChar char=""/>
+              <a:defRPr sz="2600" b="1" kern="1200">
+                <a:solidFill>
+                  <a:schemeClr val="tx1">
+                    <a:lumMod val="20000"/>
+                    <a:lumOff val="80000"/>
+                  </a:schemeClr>
+                </a:solidFill>
+                <a:effectLst>
+                  <a:outerShdw blurRad="38100" dist="38100" dir="2700000" algn="tl">
+                    <a:srgbClr val="000000">
+                      <a:alpha val="43137"/>
+                    </a:srgbClr>
+                  </a:outerShdw>
+                </a:effectLst>
+                <a:latin typeface="+mn-lt"/>
+                <a:ea typeface="+mn-ea"/>
+                <a:cs typeface="+mn-cs"/>
+              </a:defRPr>
+            </a:lvl4pPr>
+            <a:lvl5pPr marL="1425575" indent="-228600" algn="l" rtl="0" eaLnBrk="0" fontAlgn="base" hangingPunct="0">
+              <a:spcBef>
+                <a:spcPct val="20000"/>
+              </a:spcBef>
+              <a:spcAft>
+                <a:spcPct val="0"/>
+              </a:spcAft>
+              <a:buClr>
+                <a:srgbClr val="46A6BD"/>
+              </a:buClr>
+              <a:buFont typeface="Wingdings 2" pitchFamily="18" charset="2"/>
+              <a:buChar char=""/>
+              <a:defRPr sz="2400" b="1" kern="1200">
+                <a:solidFill>
+                  <a:schemeClr val="tx1">
+                    <a:lumMod val="20000"/>
+                    <a:lumOff val="80000"/>
+                  </a:schemeClr>
+                </a:solidFill>
+                <a:effectLst>
+                  <a:outerShdw blurRad="38100" dist="38100" dir="2700000" algn="tl">
+                    <a:srgbClr val="000000">
+                      <a:alpha val="43137"/>
+                    </a:srgbClr>
+                  </a:outerShdw>
+                </a:effectLst>
+                <a:latin typeface="+mn-lt"/>
+                <a:ea typeface="+mn-ea"/>
+                <a:cs typeface="+mn-cs"/>
+              </a:defRPr>
+            </a:lvl5pPr>
+            <a:lvl6pPr marL="1673352" indent="-228600" algn="l" rtl="0" eaLnBrk="1" latinLnBrk="0" hangingPunct="1">
+              <a:spcBef>
+                <a:spcPct val="20000"/>
+              </a:spcBef>
+              <a:buClr>
+                <a:schemeClr val="accent6"/>
+              </a:buClr>
+              <a:buFont typeface="Wingdings 2"/>
+              <a:buChar char=""/>
+              <a:defRPr sz="1800" kern="1200">
+                <a:solidFill>
+                  <a:schemeClr val="tx1"/>
+                </a:solidFill>
+                <a:latin typeface="+mn-lt"/>
+                <a:ea typeface="+mn-ea"/>
+                <a:cs typeface="+mn-cs"/>
+              </a:defRPr>
+            </a:lvl6pPr>
+            <a:lvl7pPr marL="1911096" indent="-228600" algn="l" rtl="0" eaLnBrk="1" latinLnBrk="0" hangingPunct="1">
+              <a:spcBef>
+                <a:spcPct val="20000"/>
+              </a:spcBef>
+              <a:buClr>
+                <a:schemeClr val="tx2"/>
+              </a:buClr>
+              <a:buFont typeface="Wingdings 2"/>
+              <a:buChar char=""/>
+              <a:defRPr sz="1600" kern="1200">
+                <a:solidFill>
+                  <a:schemeClr val="tx1"/>
+                </a:solidFill>
+                <a:latin typeface="+mn-lt"/>
+                <a:ea typeface="+mn-ea"/>
+                <a:cs typeface="+mn-cs"/>
+              </a:defRPr>
+            </a:lvl7pPr>
+            <a:lvl8pPr marL="2121408" indent="-182880" algn="l" rtl="0" eaLnBrk="1" latinLnBrk="0" hangingPunct="1">
+              <a:spcBef>
+                <a:spcPct val="20000"/>
+              </a:spcBef>
+              <a:buClr>
+                <a:schemeClr val="tx2"/>
+              </a:buClr>
+              <a:buFont typeface="Wingdings 2"/>
+              <a:buChar char=""/>
+              <a:defRPr sz="1400" kern="1200">
+                <a:solidFill>
+                  <a:schemeClr val="tx1"/>
+                </a:solidFill>
+                <a:latin typeface="+mn-lt"/>
+                <a:ea typeface="+mn-ea"/>
+                <a:cs typeface="+mn-cs"/>
+              </a:defRPr>
+            </a:lvl8pPr>
+            <a:lvl9pPr marL="2322576" indent="-182880" algn="l" rtl="0" eaLnBrk="1" latinLnBrk="0" hangingPunct="1">
+              <a:spcBef>
+                <a:spcPct val="20000"/>
+              </a:spcBef>
+              <a:buClr>
+                <a:schemeClr val="tx2"/>
+              </a:buClr>
+              <a:buFont typeface="Wingdings 2"/>
+              <a:buChar char=""/>
+              <a:defRPr sz="1400" kern="1200">
+                <a:solidFill>
+                  <a:schemeClr val="tx1"/>
+                </a:solidFill>
+                <a:latin typeface="+mn-lt"/>
+                <a:ea typeface="+mn-ea"/>
+                <a:cs typeface="+mn-cs"/>
+              </a:defRPr>
+            </a:lvl9pPr>
+          </a:lstStyle>
+          <a:p>
+            <a:r>
+              <a:rPr lang="en-US" dirty="0"/>
+              <a:t>Telerik Software Academy</a:t>
+            </a:r>
+          </a:p>
+        </p:txBody>
+      </p:sp>
+      <p:sp>
+        <p:nvSpPr>
+          <p:cNvPr id="20" name="Text Placeholder 7"/>
+          <p:cNvSpPr>
+            <a:spLocks noGrp="1"/>
+          </p:cNvSpPr>
+          <p:nvPr/>
+        </p:nvSpPr>
+        <p:spPr>
+          <a:xfrm>
+            <a:off x="429087" y="6031468"/>
+            <a:ext cx="3990513" cy="369332"/>
+          </a:xfrm>
+          <a:prstGeom prst="rect">
+            <a:avLst/>
+          </a:prstGeom>
+          <a:noFill/>
+        </p:spPr>
+        <p:txBody>
+          <a:bodyPr wrap="square" rtlCol="0">
+            <a:spAutoFit/>
+          </a:bodyPr>
+          <a:lstStyle>
+            <a:lvl1pPr marL="319088" indent="-319088" algn="l" rtl="0" eaLnBrk="0" fontAlgn="base" hangingPunct="0">
+              <a:spcBef>
+                <a:spcPct val="20000"/>
+              </a:spcBef>
+              <a:spcAft>
+                <a:spcPct val="0"/>
+              </a:spcAft>
+              <a:buClr>
+                <a:schemeClr val="accent5">
+                  <a:lumMod val="40000"/>
+                  <a:lumOff val="60000"/>
+                </a:schemeClr>
+              </a:buClr>
+              <a:buSzPct val="70000"/>
+              <a:buFont typeface="Wingdings 2" pitchFamily="18" charset="2"/>
+              <a:buNone/>
+              <a:defRPr lang="en-US" sz="1800" b="1" kern="1200" dirty="0">
+                <a:solidFill>
+                  <a:schemeClr val="tx2">
+                    <a:lumMod val="20000"/>
+                    <a:lumOff val="80000"/>
+                  </a:schemeClr>
+                </a:solidFill>
+                <a:effectLst>
+                  <a:outerShdw blurRad="38100" dist="38100" dir="2700000" algn="tl">
+                    <a:srgbClr val="000000">
+                      <a:alpha val="43137"/>
+                    </a:srgbClr>
+                  </a:outerShdw>
+                </a:effectLst>
+                <a:latin typeface="Corbel" pitchFamily="34" charset="0"/>
+                <a:ea typeface="+mn-ea"/>
+                <a:cs typeface="+mn-cs"/>
+              </a:defRPr>
+            </a:lvl1pPr>
+            <a:lvl2pPr marL="630238" indent="-273050" algn="l" rtl="0" eaLnBrk="0" fontAlgn="base" hangingPunct="0">
+              <a:spcBef>
+                <a:spcPct val="20000"/>
+              </a:spcBef>
+              <a:spcAft>
+                <a:spcPct val="0"/>
+              </a:spcAft>
+              <a:buClr>
+                <a:schemeClr val="accent2">
+                  <a:lumMod val="60000"/>
+                  <a:lumOff val="40000"/>
+                </a:schemeClr>
+              </a:buClr>
+              <a:buFont typeface="Wingdings 2" pitchFamily="18" charset="2"/>
+              <a:buChar char=""/>
+              <a:defRPr sz="3000" b="1" kern="1200">
+                <a:solidFill>
+                  <a:schemeClr val="tx1">
+                    <a:lumMod val="20000"/>
+                    <a:lumOff val="80000"/>
+                  </a:schemeClr>
+                </a:solidFill>
+                <a:effectLst>
+                  <a:outerShdw blurRad="38100" dist="38100" dir="2700000" algn="tl">
+                    <a:srgbClr val="000000">
+                      <a:alpha val="43137"/>
+                    </a:srgbClr>
+                  </a:outerShdw>
+                </a:effectLst>
+                <a:latin typeface="+mn-lt"/>
+                <a:ea typeface="+mn-ea"/>
+                <a:cs typeface="+mn-cs"/>
+              </a:defRPr>
+            </a:lvl2pPr>
+            <a:lvl3pPr marL="922338" indent="-273050" algn="l" rtl="0" eaLnBrk="0" fontAlgn="base" hangingPunct="0">
+              <a:spcBef>
+                <a:spcPct val="20000"/>
+              </a:spcBef>
+              <a:spcAft>
+                <a:spcPct val="0"/>
+              </a:spcAft>
+              <a:buClr>
+                <a:schemeClr val="tx1">
+                  <a:lumMod val="50000"/>
+                </a:schemeClr>
+              </a:buClr>
+              <a:buFont typeface="Wingdings 2" pitchFamily="18" charset="2"/>
+              <a:buChar char=""/>
+              <a:defRPr sz="2800" b="1" kern="1200">
+                <a:solidFill>
+                  <a:schemeClr val="tx1">
+                    <a:lumMod val="20000"/>
+                    <a:lumOff val="80000"/>
+                  </a:schemeClr>
+                </a:solidFill>
+                <a:effectLst>
+                  <a:outerShdw blurRad="38100" dist="38100" dir="2700000" algn="tl">
+                    <a:srgbClr val="000000">
+                      <a:alpha val="43137"/>
+                    </a:srgbClr>
+                  </a:outerShdw>
+                </a:effectLst>
+                <a:latin typeface="+mn-lt"/>
+                <a:ea typeface="+mn-ea"/>
+                <a:cs typeface="+mn-cs"/>
+              </a:defRPr>
+            </a:lvl3pPr>
+            <a:lvl4pPr marL="1187450" indent="-228600" algn="l" rtl="0" eaLnBrk="0" fontAlgn="base" hangingPunct="0">
+              <a:spcBef>
+                <a:spcPct val="20000"/>
+              </a:spcBef>
+              <a:spcAft>
+                <a:spcPct val="0"/>
+              </a:spcAft>
+              <a:buClr>
+                <a:srgbClr val="F8BD52"/>
+              </a:buClr>
+              <a:buFont typeface="Wingdings 2" pitchFamily="18" charset="2"/>
+              <a:buChar char=""/>
+              <a:defRPr sz="2600" b="1" kern="1200">
+                <a:solidFill>
+                  <a:schemeClr val="tx1">
+                    <a:lumMod val="20000"/>
+                    <a:lumOff val="80000"/>
+                  </a:schemeClr>
+                </a:solidFill>
+                <a:effectLst>
+                  <a:outerShdw blurRad="38100" dist="38100" dir="2700000" algn="tl">
+                    <a:srgbClr val="000000">
+                      <a:alpha val="43137"/>
+                    </a:srgbClr>
+                  </a:outerShdw>
+                </a:effectLst>
+                <a:latin typeface="+mn-lt"/>
+                <a:ea typeface="+mn-ea"/>
+                <a:cs typeface="+mn-cs"/>
+              </a:defRPr>
+            </a:lvl4pPr>
+            <a:lvl5pPr marL="1425575" indent="-228600" algn="l" rtl="0" eaLnBrk="0" fontAlgn="base" hangingPunct="0">
+              <a:spcBef>
+                <a:spcPct val="20000"/>
+              </a:spcBef>
+              <a:spcAft>
+                <a:spcPct val="0"/>
+              </a:spcAft>
+              <a:buClr>
+                <a:srgbClr val="46A6BD"/>
+              </a:buClr>
+              <a:buFont typeface="Wingdings 2" pitchFamily="18" charset="2"/>
+              <a:buChar char=""/>
+              <a:defRPr sz="2400" b="1" kern="1200">
+                <a:solidFill>
+                  <a:schemeClr val="tx1">
+                    <a:lumMod val="20000"/>
+                    <a:lumOff val="80000"/>
+                  </a:schemeClr>
+                </a:solidFill>
+                <a:effectLst>
+                  <a:outerShdw blurRad="38100" dist="38100" dir="2700000" algn="tl">
+                    <a:srgbClr val="000000">
+                      <a:alpha val="43137"/>
+                    </a:srgbClr>
+                  </a:outerShdw>
+                </a:effectLst>
+                <a:latin typeface="+mn-lt"/>
+                <a:ea typeface="+mn-ea"/>
+                <a:cs typeface="+mn-cs"/>
+              </a:defRPr>
+            </a:lvl5pPr>
+            <a:lvl6pPr marL="1673352" indent="-228600" algn="l" rtl="0" eaLnBrk="1" latinLnBrk="0" hangingPunct="1">
+              <a:spcBef>
+                <a:spcPct val="20000"/>
+              </a:spcBef>
+              <a:buClr>
+                <a:schemeClr val="accent6"/>
+              </a:buClr>
+              <a:buFont typeface="Wingdings 2"/>
+              <a:buChar char=""/>
+              <a:defRPr sz="1800" kern="1200">
+                <a:solidFill>
+                  <a:schemeClr val="tx1"/>
+                </a:solidFill>
+                <a:latin typeface="+mn-lt"/>
+                <a:ea typeface="+mn-ea"/>
+                <a:cs typeface="+mn-cs"/>
+              </a:defRPr>
+            </a:lvl6pPr>
+            <a:lvl7pPr marL="1911096" indent="-228600" algn="l" rtl="0" eaLnBrk="1" latinLnBrk="0" hangingPunct="1">
+              <a:spcBef>
+                <a:spcPct val="20000"/>
+              </a:spcBef>
+              <a:buClr>
+                <a:schemeClr val="tx2"/>
+              </a:buClr>
+              <a:buFont typeface="Wingdings 2"/>
+              <a:buChar char=""/>
+              <a:defRPr sz="1600" kern="1200">
+                <a:solidFill>
+                  <a:schemeClr val="tx1"/>
+                </a:solidFill>
+                <a:latin typeface="+mn-lt"/>
+                <a:ea typeface="+mn-ea"/>
+                <a:cs typeface="+mn-cs"/>
+              </a:defRPr>
+            </a:lvl7pPr>
+            <a:lvl8pPr marL="2121408" indent="-182880" algn="l" rtl="0" eaLnBrk="1" latinLnBrk="0" hangingPunct="1">
+              <a:spcBef>
+                <a:spcPct val="20000"/>
+              </a:spcBef>
+              <a:buClr>
+                <a:schemeClr val="tx2"/>
+              </a:buClr>
+              <a:buFont typeface="Wingdings 2"/>
+              <a:buChar char=""/>
+              <a:defRPr sz="1400" kern="1200">
+                <a:solidFill>
+                  <a:schemeClr val="tx1"/>
+                </a:solidFill>
+                <a:latin typeface="+mn-lt"/>
+                <a:ea typeface="+mn-ea"/>
+                <a:cs typeface="+mn-cs"/>
+              </a:defRPr>
+            </a:lvl8pPr>
+            <a:lvl9pPr marL="2322576" indent="-182880" algn="l" rtl="0" eaLnBrk="1" latinLnBrk="0" hangingPunct="1">
+              <a:spcBef>
+                <a:spcPct val="20000"/>
+              </a:spcBef>
+              <a:buClr>
+                <a:schemeClr val="tx2"/>
+              </a:buClr>
+              <a:buFont typeface="Wingdings 2"/>
+              <a:buChar char=""/>
+              <a:defRPr sz="1400" kern="1200">
+                <a:solidFill>
+                  <a:schemeClr val="tx1"/>
+                </a:solidFill>
+                <a:latin typeface="+mn-lt"/>
+                <a:ea typeface="+mn-ea"/>
+                <a:cs typeface="+mn-cs"/>
+              </a:defRPr>
+            </a:lvl9pPr>
+          </a:lstStyle>
+          <a:p>
+            <a:r>
+              <a:rPr lang="en-US" dirty="0" smtClean="0">
+                <a:hlinkClick r:id="rId8"/>
+              </a:rPr>
+              <a:t>http://academy.telerik.com</a:t>
+            </a:r>
+            <a:r>
+              <a:rPr lang="en-US" dirty="0" smtClean="0"/>
+              <a:t> </a:t>
+            </a:r>
+            <a:endParaRPr lang="en-US" dirty="0"/>
+          </a:p>
+        </p:txBody>
+      </p:sp>
+      <p:sp>
+        <p:nvSpPr>
+          <p:cNvPr id="21" name="Text Placeholder 13"/>
+          <p:cNvSpPr>
+            <a:spLocks noGrp="1"/>
+          </p:cNvSpPr>
+          <p:nvPr/>
+        </p:nvSpPr>
+        <p:spPr>
+          <a:xfrm>
+            <a:off x="429087" y="5352025"/>
+            <a:ext cx="4523913" cy="461665"/>
+          </a:xfrm>
+          <a:prstGeom prst="rect">
+            <a:avLst/>
+          </a:prstGeom>
+          <a:noFill/>
+        </p:spPr>
+        <p:txBody>
+          <a:bodyPr wrap="square" rtlCol="0">
+            <a:spAutoFit/>
+          </a:bodyPr>
+          <a:lstStyle>
+            <a:lvl1pPr marL="0" indent="0" algn="l" rtl="0" eaLnBrk="0" fontAlgn="base" hangingPunct="0">
+              <a:spcBef>
+                <a:spcPct val="20000"/>
+              </a:spcBef>
+              <a:spcAft>
+                <a:spcPct val="0"/>
+              </a:spcAft>
+              <a:buClr>
+                <a:schemeClr val="accent5">
+                  <a:lumMod val="40000"/>
+                  <a:lumOff val="60000"/>
+                </a:schemeClr>
+              </a:buClr>
+              <a:buSzPct val="70000"/>
+              <a:buFont typeface="Wingdings 2" pitchFamily="18" charset="2"/>
+              <a:buNone/>
+              <a:defRPr lang="en-US" sz="2400" b="1" kern="1200" dirty="0">
+                <a:solidFill>
+                  <a:schemeClr val="tx2">
+                    <a:lumMod val="50000"/>
+                  </a:schemeClr>
+                </a:solidFill>
+                <a:effectLst>
+                  <a:outerShdw blurRad="38100" dist="38100" dir="2700000" algn="tl">
+                    <a:srgbClr val="000000">
+                      <a:alpha val="43137"/>
+                    </a:srgbClr>
+                  </a:outerShdw>
+                </a:effectLst>
+                <a:latin typeface="Corbel" pitchFamily="34" charset="0"/>
+                <a:ea typeface="+mn-ea"/>
+                <a:cs typeface="+mn-cs"/>
+              </a:defRPr>
+            </a:lvl1pPr>
+            <a:lvl2pPr marL="630238" indent="-273050" algn="l" rtl="0" eaLnBrk="0" fontAlgn="base" hangingPunct="0">
+              <a:spcBef>
+                <a:spcPct val="20000"/>
+              </a:spcBef>
+              <a:spcAft>
+                <a:spcPct val="0"/>
+              </a:spcAft>
+              <a:buClr>
+                <a:schemeClr val="accent2">
+                  <a:lumMod val="60000"/>
+                  <a:lumOff val="40000"/>
+                </a:schemeClr>
+              </a:buClr>
+              <a:buFont typeface="Wingdings 2" pitchFamily="18" charset="2"/>
+              <a:buChar char=""/>
+              <a:defRPr sz="3000" b="1" kern="1200">
+                <a:solidFill>
+                  <a:schemeClr val="tx1">
+                    <a:lumMod val="20000"/>
+                    <a:lumOff val="80000"/>
+                  </a:schemeClr>
+                </a:solidFill>
+                <a:effectLst>
+                  <a:outerShdw blurRad="38100" dist="38100" dir="2700000" algn="tl">
+                    <a:srgbClr val="000000">
+                      <a:alpha val="43137"/>
+                    </a:srgbClr>
+                  </a:outerShdw>
+                </a:effectLst>
+                <a:latin typeface="+mn-lt"/>
+                <a:ea typeface="+mn-ea"/>
+                <a:cs typeface="+mn-cs"/>
+              </a:defRPr>
+            </a:lvl2pPr>
+            <a:lvl3pPr marL="922338" indent="-273050" algn="l" rtl="0" eaLnBrk="0" fontAlgn="base" hangingPunct="0">
+              <a:spcBef>
+                <a:spcPct val="20000"/>
+              </a:spcBef>
+              <a:spcAft>
+                <a:spcPct val="0"/>
+              </a:spcAft>
+              <a:buClr>
+                <a:schemeClr val="tx1">
+                  <a:lumMod val="50000"/>
+                </a:schemeClr>
+              </a:buClr>
+              <a:buFont typeface="Wingdings 2" pitchFamily="18" charset="2"/>
+              <a:buChar char=""/>
+              <a:defRPr sz="2800" b="1" kern="1200">
+                <a:solidFill>
+                  <a:schemeClr val="tx1">
+                    <a:lumMod val="20000"/>
+                    <a:lumOff val="80000"/>
+                  </a:schemeClr>
+                </a:solidFill>
+                <a:effectLst>
+                  <a:outerShdw blurRad="38100" dist="38100" dir="2700000" algn="tl">
+                    <a:srgbClr val="000000">
+                      <a:alpha val="43137"/>
+                    </a:srgbClr>
+                  </a:outerShdw>
+                </a:effectLst>
+                <a:latin typeface="+mn-lt"/>
+                <a:ea typeface="+mn-ea"/>
+                <a:cs typeface="+mn-cs"/>
+              </a:defRPr>
+            </a:lvl3pPr>
+            <a:lvl4pPr marL="1187450" indent="-228600" algn="l" rtl="0" eaLnBrk="0" fontAlgn="base" hangingPunct="0">
+              <a:spcBef>
+                <a:spcPct val="20000"/>
+              </a:spcBef>
+              <a:spcAft>
+                <a:spcPct val="0"/>
+              </a:spcAft>
+              <a:buClr>
+                <a:srgbClr val="F8BD52"/>
+              </a:buClr>
+              <a:buFont typeface="Wingdings 2" pitchFamily="18" charset="2"/>
+              <a:buChar char=""/>
+              <a:defRPr sz="2600" b="1" kern="1200">
+                <a:solidFill>
+                  <a:schemeClr val="tx1">
+                    <a:lumMod val="20000"/>
+                    <a:lumOff val="80000"/>
+                  </a:schemeClr>
+                </a:solidFill>
+                <a:effectLst>
+                  <a:outerShdw blurRad="38100" dist="38100" dir="2700000" algn="tl">
+                    <a:srgbClr val="000000">
+                      <a:alpha val="43137"/>
+                    </a:srgbClr>
+                  </a:outerShdw>
+                </a:effectLst>
+                <a:latin typeface="+mn-lt"/>
+                <a:ea typeface="+mn-ea"/>
+                <a:cs typeface="+mn-cs"/>
+              </a:defRPr>
+            </a:lvl4pPr>
+            <a:lvl5pPr marL="1425575" indent="-228600" algn="l" rtl="0" eaLnBrk="0" fontAlgn="base" hangingPunct="0">
+              <a:spcBef>
+                <a:spcPct val="20000"/>
+              </a:spcBef>
+              <a:spcAft>
+                <a:spcPct val="0"/>
+              </a:spcAft>
+              <a:buClr>
+                <a:srgbClr val="46A6BD"/>
+              </a:buClr>
+              <a:buFont typeface="Wingdings 2" pitchFamily="18" charset="2"/>
+              <a:buChar char=""/>
+              <a:defRPr sz="2400" b="1" kern="1200">
+                <a:solidFill>
+                  <a:schemeClr val="tx1">
+                    <a:lumMod val="20000"/>
+                    <a:lumOff val="80000"/>
+                  </a:schemeClr>
+                </a:solidFill>
+                <a:effectLst>
+                  <a:outerShdw blurRad="38100" dist="38100" dir="2700000" algn="tl">
+                    <a:srgbClr val="000000">
+                      <a:alpha val="43137"/>
+                    </a:srgbClr>
+                  </a:outerShdw>
+                </a:effectLst>
+                <a:latin typeface="+mn-lt"/>
+                <a:ea typeface="+mn-ea"/>
+                <a:cs typeface="+mn-cs"/>
+              </a:defRPr>
+            </a:lvl5pPr>
+            <a:lvl6pPr marL="1673352" indent="-228600" algn="l" rtl="0" eaLnBrk="1" latinLnBrk="0" hangingPunct="1">
+              <a:spcBef>
+                <a:spcPct val="20000"/>
+              </a:spcBef>
+              <a:buClr>
+                <a:schemeClr val="accent6"/>
+              </a:buClr>
+              <a:buFont typeface="Wingdings 2"/>
+              <a:buChar char=""/>
+              <a:defRPr sz="1800" kern="1200">
+                <a:solidFill>
+                  <a:schemeClr val="tx1"/>
+                </a:solidFill>
+                <a:latin typeface="+mn-lt"/>
+                <a:ea typeface="+mn-ea"/>
+                <a:cs typeface="+mn-cs"/>
+              </a:defRPr>
+            </a:lvl6pPr>
+            <a:lvl7pPr marL="1911096" indent="-228600" algn="l" rtl="0" eaLnBrk="1" latinLnBrk="0" hangingPunct="1">
+              <a:spcBef>
+                <a:spcPct val="20000"/>
+              </a:spcBef>
+              <a:buClr>
+                <a:schemeClr val="tx2"/>
+              </a:buClr>
+              <a:buFont typeface="Wingdings 2"/>
+              <a:buChar char=""/>
+              <a:defRPr sz="1600" kern="1200">
+                <a:solidFill>
+                  <a:schemeClr val="tx1"/>
+                </a:solidFill>
+                <a:latin typeface="+mn-lt"/>
+                <a:ea typeface="+mn-ea"/>
+                <a:cs typeface="+mn-cs"/>
+              </a:defRPr>
+            </a:lvl7pPr>
+            <a:lvl8pPr marL="2121408" indent="-182880" algn="l" rtl="0" eaLnBrk="1" latinLnBrk="0" hangingPunct="1">
+              <a:spcBef>
+                <a:spcPct val="20000"/>
+              </a:spcBef>
+              <a:buClr>
+                <a:schemeClr val="tx2"/>
+              </a:buClr>
+              <a:buFont typeface="Wingdings 2"/>
+              <a:buChar char=""/>
+              <a:defRPr sz="1400" kern="1200">
+                <a:solidFill>
+                  <a:schemeClr val="tx1"/>
+                </a:solidFill>
+                <a:latin typeface="+mn-lt"/>
+                <a:ea typeface="+mn-ea"/>
+                <a:cs typeface="+mn-cs"/>
+              </a:defRPr>
+            </a:lvl8pPr>
+            <a:lvl9pPr marL="2322576" indent="-182880" algn="l" rtl="0" eaLnBrk="1" latinLnBrk="0" hangingPunct="1">
+              <a:spcBef>
+                <a:spcPct val="20000"/>
+              </a:spcBef>
+              <a:buClr>
+                <a:schemeClr val="tx2"/>
+              </a:buClr>
+              <a:buFont typeface="Wingdings 2"/>
+              <a:buChar char=""/>
+              <a:defRPr sz="1400" kern="1200">
+                <a:solidFill>
+                  <a:schemeClr val="tx1"/>
+                </a:solidFill>
+                <a:latin typeface="+mn-lt"/>
+                <a:ea typeface="+mn-ea"/>
+                <a:cs typeface="+mn-cs"/>
+              </a:defRPr>
+            </a:lvl9pPr>
+          </a:lstStyle>
+          <a:p>
+            <a:r>
+              <a:rPr lang="en-US" dirty="0" smtClean="0"/>
+              <a:t>Data structures and algorithms</a:t>
+            </a:r>
+            <a:endParaRPr lang="en-US" dirty="0"/>
+          </a:p>
+        </p:txBody>
+      </p:sp>
     </p:spTree>
   </p:cSld>
   <p:clrMapOvr>
@@ -40746,11 +41409,7 @@
             </a:pPr>
             <a:r>
               <a:rPr lang="en-US" sz="2800" dirty="0" smtClean="0"/>
-              <a:t>What is the expected running time of the following C# code? </a:t>
-            </a:r>
-            <a:r>
-              <a:rPr lang="en-US" sz="2800" dirty="0" smtClean="0"/>
-              <a:t>Explain why. Assume the array's size is </a:t>
+              <a:t>What is the expected running time of the following C# code? Explain why. Assume the array's size is </a:t>
             </a:r>
             <a:r>
               <a:rPr lang="en-US" sz="2800" dirty="0" smtClean="0">
@@ -40995,10 +41654,10 @@
                 <a:latin typeface="Consolas" pitchFamily="49" charset="0"/>
                 <a:cs typeface="Consolas" pitchFamily="49" charset="0"/>
               </a:rPr>
-              <a:t>    for (int i=0</a:t>
-            </a:r>
-            <a:r>
-              <a:rPr lang="en-US" sz="1800" b="1" noProof="1">
+              <a:t>    for (int i=0; </a:t>
+            </a:r>
+            <a:r>
+              <a:rPr lang="en-US" sz="1800" b="1" noProof="1" smtClean="0">
                 <a:solidFill>
                   <a:srgbClr val="8CF4F2"/>
                 </a:solidFill>
@@ -41012,10 +41671,10 @@
                 <a:latin typeface="Consolas" pitchFamily="49" charset="0"/>
                 <a:cs typeface="Consolas" pitchFamily="49" charset="0"/>
               </a:rPr>
-              <a:t>; </a:t>
-            </a:r>
-            <a:r>
-              <a:rPr lang="en-US" sz="1800" b="1" noProof="1" smtClean="0">
+              <a:t>i&lt;arr.Length</a:t>
+            </a:r>
+            <a:r>
+              <a:rPr lang="en-US" sz="1800" b="1" noProof="1">
                 <a:solidFill>
                   <a:srgbClr val="8CF4F2"/>
                 </a:solidFill>
@@ -41029,41 +41688,7 @@
                 <a:latin typeface="Consolas" pitchFamily="49" charset="0"/>
                 <a:cs typeface="Consolas" pitchFamily="49" charset="0"/>
               </a:rPr>
-              <a:t>i&lt;arr.Length</a:t>
-            </a:r>
-            <a:r>
-              <a:rPr lang="en-US" sz="1800" b="1" noProof="1">
-                <a:solidFill>
-                  <a:srgbClr val="8CF4F2"/>
-                </a:solidFill>
-                <a:effectLst>
-                  <a:outerShdw blurRad="38100" dist="38100" dir="2700000" algn="tl">
-                    <a:srgbClr val="000000">
-                      <a:alpha val="43137"/>
-                    </a:srgbClr>
-                  </a:outerShdw>
-                </a:effectLst>
-                <a:latin typeface="Consolas" pitchFamily="49" charset="0"/>
-                <a:cs typeface="Consolas" pitchFamily="49" charset="0"/>
-              </a:rPr>
-              <a:t>; </a:t>
-            </a:r>
-            <a:r>
-              <a:rPr lang="en-US" sz="1800" b="1" noProof="1">
-                <a:solidFill>
-                  <a:srgbClr val="8CF4F2"/>
-                </a:solidFill>
-                <a:effectLst>
-                  <a:outerShdw blurRad="38100" dist="38100" dir="2700000" algn="tl">
-                    <a:srgbClr val="000000">
-                      <a:alpha val="43137"/>
-                    </a:srgbClr>
-                  </a:outerShdw>
-                </a:effectLst>
-                <a:latin typeface="Consolas" pitchFamily="49" charset="0"/>
-                <a:cs typeface="Consolas" pitchFamily="49" charset="0"/>
-              </a:rPr>
-              <a:t>i</a:t>
+              <a:t>; i</a:t>
             </a:r>
             <a:r>
               <a:rPr lang="en-US" sz="1800" b="1" noProof="1" smtClean="0">
@@ -41482,24 +42107,7 @@
                 <a:latin typeface="Consolas" pitchFamily="49" charset="0"/>
                 <a:cs typeface="Consolas" pitchFamily="49" charset="0"/>
               </a:rPr>
-              <a:t>    </a:t>
-            </a:r>
-            <a:r>
-              <a:rPr lang="en-US" sz="1800" b="1" noProof="1">
-                <a:solidFill>
-                  <a:srgbClr val="8CF4F2"/>
-                </a:solidFill>
-                <a:effectLst>
-                  <a:outerShdw blurRad="38100" dist="38100" dir="2700000" algn="tl">
-                    <a:srgbClr val="000000">
-                      <a:alpha val="43137"/>
-                    </a:srgbClr>
-                  </a:outerShdw>
-                </a:effectLst>
-                <a:latin typeface="Consolas" pitchFamily="49" charset="0"/>
-                <a:cs typeface="Consolas" pitchFamily="49" charset="0"/>
-              </a:rPr>
-              <a:t>return </a:t>
+              <a:t>    return </a:t>
             </a:r>
             <a:r>
               <a:rPr lang="en-US" sz="1800" b="1" noProof="1" smtClean="0">
@@ -41655,11 +42263,7 @@
             </a:pPr>
             <a:r>
               <a:rPr lang="en-US" sz="2800" dirty="0" smtClean="0"/>
-              <a:t>What is the expected running time of the following C# code? </a:t>
-            </a:r>
-            <a:r>
-              <a:rPr lang="en-US" sz="2800" dirty="0" smtClean="0"/>
-              <a:t>Explain why.</a:t>
+              <a:t>What is the expected running time of the following C# code? Explain why.</a:t>
             </a:r>
           </a:p>
           <a:p>
@@ -41976,24 +42580,7 @@
                 <a:latin typeface="Consolas" pitchFamily="49" charset="0"/>
                 <a:cs typeface="Consolas" pitchFamily="49" charset="0"/>
               </a:rPr>
-              <a:t>    for (</a:t>
-            </a:r>
-            <a:r>
-              <a:rPr lang="en-US" sz="1800" b="1" noProof="1">
-                <a:solidFill>
-                  <a:srgbClr val="8CF4F2"/>
-                </a:solidFill>
-                <a:effectLst>
-                  <a:outerShdw blurRad="38100" dist="38100" dir="2700000" algn="tl">
-                    <a:srgbClr val="000000">
-                      <a:alpha val="43137"/>
-                    </a:srgbClr>
-                  </a:outerShdw>
-                </a:effectLst>
-                <a:latin typeface="Consolas" pitchFamily="49" charset="0"/>
-                <a:cs typeface="Consolas" pitchFamily="49" charset="0"/>
-              </a:rPr>
-              <a:t>int </a:t>
+              <a:t>    for (int </a:t>
             </a:r>
             <a:r>
               <a:rPr lang="en-US" sz="1800" b="1" noProof="1" smtClean="0">
@@ -42129,24 +42716,7 @@
                 <a:latin typeface="Consolas" pitchFamily="49" charset="0"/>
                 <a:cs typeface="Consolas" pitchFamily="49" charset="0"/>
               </a:rPr>
-              <a:t>(</a:t>
-            </a:r>
-            <a:r>
-              <a:rPr lang="en-US" sz="1800" b="1" noProof="1">
-                <a:solidFill>
-                  <a:srgbClr val="8CF4F2"/>
-                </a:solidFill>
-                <a:effectLst>
-                  <a:outerShdw blurRad="38100" dist="38100" dir="2700000" algn="tl">
-                    <a:srgbClr val="000000">
-                      <a:alpha val="43137"/>
-                    </a:srgbClr>
-                  </a:outerShdw>
-                </a:effectLst>
-                <a:latin typeface="Consolas" pitchFamily="49" charset="0"/>
-                <a:cs typeface="Consolas" pitchFamily="49" charset="0"/>
-              </a:rPr>
-              <a:t>int </a:t>
+              <a:t>(int </a:t>
             </a:r>
             <a:r>
               <a:rPr lang="en-US" sz="1800" b="1" noProof="1" smtClean="0">
@@ -42472,11 +43042,7 @@
             </a:pPr>
             <a:r>
               <a:rPr lang="en-US" sz="2800" dirty="0" smtClean="0"/>
-              <a:t>* What is the expected running time of the following C# code? </a:t>
-            </a:r>
-            <a:r>
-              <a:rPr lang="en-US" sz="2800" dirty="0" smtClean="0"/>
-              <a:t>Explain why.</a:t>
+              <a:t>* What is the expected running time of the following C# code? Explain why.</a:t>
             </a:r>
           </a:p>
           <a:p>
@@ -43023,20 +43589,6 @@
               </a:rPr>
               <a:t>0));</a:t>
             </a:r>
-            <a:endParaRPr lang="en-US" sz="1800" b="1" noProof="1">
-              <a:solidFill>
-                <a:srgbClr val="8CF4F2"/>
-              </a:solidFill>
-              <a:effectLst>
-                <a:outerShdw blurRad="38100" dist="38100" dir="2700000" algn="tl">
-                  <a:srgbClr val="000000">
-                    <a:alpha val="43137"/>
-                  </a:srgbClr>
-                </a:outerShdw>
-              </a:effectLst>
-              <a:latin typeface="Consolas" pitchFamily="49" charset="0"/>
-              <a:cs typeface="Consolas" pitchFamily="49" charset="0"/>
-            </a:endParaRPr>
           </a:p>
         </p:txBody>
       </p:sp>

</xml_diff>